<commit_message>
Persona com o Gerente
Gerente Alessandro
</commit_message>
<xml_diff>
--- a/Projeto SIX MIND/Documentação/Persona.pptx
+++ b/Projeto SIX MIND/Documentação/Persona.pptx
@@ -6,7 +6,8 @@
   </p:sldMasterIdLst>
   <p:sldIdLst>
     <p:sldId id="256" r:id="rId2"/>
-    <p:sldId id="257" r:id="rId3"/>
+    <p:sldId id="258" r:id="rId3"/>
+    <p:sldId id="257" r:id="rId4"/>
   </p:sldIdLst>
   <p:sldSz cx="12192000" cy="6858000"/>
   <p:notesSz cx="6858000" cy="9144000"/>
@@ -105,6 +106,11 @@
       </a:defRPr>
     </a:lvl9pPr>
   </p:defaultTextStyle>
+  <p:extLst>
+    <p:ext uri="{EFAFB233-063F-42B5-8137-9DF3F51BA10A}">
+      <p15:sldGuideLst xmlns:p15="http://schemas.microsoft.com/office/powerpoint/2012/main"/>
+    </p:ext>
+  </p:extLst>
 </p:presentation>
 </file>
 
@@ -239,7 +245,7 @@
           <a:p>
             <a:fld id="{CC6831E4-0DA0-44A1-AED6-DAEB15BE7357}" type="datetimeFigureOut">
               <a:rPr lang="pt-BR" smtClean="0"/>
-              <a:t>25/08/2020</a:t>
+              <a:t>01/09/2020</a:t>
             </a:fld>
             <a:endParaRPr lang="pt-BR"/>
           </a:p>
@@ -409,7 +415,7 @@
           <a:p>
             <a:fld id="{CC6831E4-0DA0-44A1-AED6-DAEB15BE7357}" type="datetimeFigureOut">
               <a:rPr lang="pt-BR" smtClean="0"/>
-              <a:t>25/08/2020</a:t>
+              <a:t>01/09/2020</a:t>
             </a:fld>
             <a:endParaRPr lang="pt-BR"/>
           </a:p>
@@ -589,7 +595,7 @@
           <a:p>
             <a:fld id="{CC6831E4-0DA0-44A1-AED6-DAEB15BE7357}" type="datetimeFigureOut">
               <a:rPr lang="pt-BR" smtClean="0"/>
-              <a:t>25/08/2020</a:t>
+              <a:t>01/09/2020</a:t>
             </a:fld>
             <a:endParaRPr lang="pt-BR"/>
           </a:p>
@@ -759,7 +765,7 @@
           <a:p>
             <a:fld id="{CC6831E4-0DA0-44A1-AED6-DAEB15BE7357}" type="datetimeFigureOut">
               <a:rPr lang="pt-BR" smtClean="0"/>
-              <a:t>25/08/2020</a:t>
+              <a:t>01/09/2020</a:t>
             </a:fld>
             <a:endParaRPr lang="pt-BR"/>
           </a:p>
@@ -1005,7 +1011,7 @@
           <a:p>
             <a:fld id="{CC6831E4-0DA0-44A1-AED6-DAEB15BE7357}" type="datetimeFigureOut">
               <a:rPr lang="pt-BR" smtClean="0"/>
-              <a:t>25/08/2020</a:t>
+              <a:t>01/09/2020</a:t>
             </a:fld>
             <a:endParaRPr lang="pt-BR"/>
           </a:p>
@@ -1237,7 +1243,7 @@
           <a:p>
             <a:fld id="{CC6831E4-0DA0-44A1-AED6-DAEB15BE7357}" type="datetimeFigureOut">
               <a:rPr lang="pt-BR" smtClean="0"/>
-              <a:t>25/08/2020</a:t>
+              <a:t>01/09/2020</a:t>
             </a:fld>
             <a:endParaRPr lang="pt-BR"/>
           </a:p>
@@ -1604,7 +1610,7 @@
           <a:p>
             <a:fld id="{CC6831E4-0DA0-44A1-AED6-DAEB15BE7357}" type="datetimeFigureOut">
               <a:rPr lang="pt-BR" smtClean="0"/>
-              <a:t>25/08/2020</a:t>
+              <a:t>01/09/2020</a:t>
             </a:fld>
             <a:endParaRPr lang="pt-BR"/>
           </a:p>
@@ -1722,7 +1728,7 @@
           <a:p>
             <a:fld id="{CC6831E4-0DA0-44A1-AED6-DAEB15BE7357}" type="datetimeFigureOut">
               <a:rPr lang="pt-BR" smtClean="0"/>
-              <a:t>25/08/2020</a:t>
+              <a:t>01/09/2020</a:t>
             </a:fld>
             <a:endParaRPr lang="pt-BR"/>
           </a:p>
@@ -1817,7 +1823,7 @@
           <a:p>
             <a:fld id="{CC6831E4-0DA0-44A1-AED6-DAEB15BE7357}" type="datetimeFigureOut">
               <a:rPr lang="pt-BR" smtClean="0"/>
-              <a:t>25/08/2020</a:t>
+              <a:t>01/09/2020</a:t>
             </a:fld>
             <a:endParaRPr lang="pt-BR"/>
           </a:p>
@@ -2094,7 +2100,7 @@
           <a:p>
             <a:fld id="{CC6831E4-0DA0-44A1-AED6-DAEB15BE7357}" type="datetimeFigureOut">
               <a:rPr lang="pt-BR" smtClean="0"/>
-              <a:t>25/08/2020</a:t>
+              <a:t>01/09/2020</a:t>
             </a:fld>
             <a:endParaRPr lang="pt-BR"/>
           </a:p>
@@ -2347,7 +2353,7 @@
           <a:p>
             <a:fld id="{CC6831E4-0DA0-44A1-AED6-DAEB15BE7357}" type="datetimeFigureOut">
               <a:rPr lang="pt-BR" smtClean="0"/>
-              <a:t>25/08/2020</a:t>
+              <a:t>01/09/2020</a:t>
             </a:fld>
             <a:endParaRPr lang="pt-BR"/>
           </a:p>
@@ -2560,7 +2566,7 @@
           <a:p>
             <a:fld id="{CC6831E4-0DA0-44A1-AED6-DAEB15BE7357}" type="datetimeFigureOut">
               <a:rPr lang="pt-BR" smtClean="0"/>
-              <a:t>25/08/2020</a:t>
+              <a:t>01/09/2020</a:t>
             </a:fld>
             <a:endParaRPr lang="pt-BR"/>
           </a:p>
@@ -3615,8 +3621,8 @@
         </p:nvSpPr>
         <p:spPr bwMode="auto">
           <a:xfrm>
-            <a:off x="4997893" y="6518997"/>
-            <a:ext cx="2278472" cy="462921"/>
+            <a:off x="4395238" y="6518997"/>
+            <a:ext cx="3401524" cy="462921"/>
           </a:xfrm>
           <a:prstGeom prst="rect">
             <a:avLst/>
@@ -3648,6 +3654,10 @@
               <a:rPr lang="pt-BR" dirty="0" err="1" smtClean="0"/>
               <a:t>SixMind</a:t>
             </a:r>
+            <a:r>
+              <a:rPr lang="pt-BR" dirty="0" smtClean="0"/>
+              <a:t> (Operação)</a:t>
+            </a:r>
             <a:endParaRPr lang="pt-BR" dirty="0"/>
           </a:p>
         </p:txBody>
@@ -3662,6 +3672,13 @@
   <p:clrMapOvr>
     <a:masterClrMapping/>
   </p:clrMapOvr>
+  <p:timing>
+    <p:tnLst>
+      <p:par>
+        <p:cTn id="1" dur="indefinite" restart="never" nodeType="tmRoot"/>
+      </p:par>
+    </p:tnLst>
+  </p:timing>
 </p:sld>
 </file>
 
@@ -3830,7 +3847,7 @@
           <a:lstStyle/>
           <a:p>
             <a:pPr algn="ctr"/>
-            <a:endParaRPr lang="pt-BR"/>
+            <a:endParaRPr lang="pt-BR" dirty="0"/>
           </a:p>
         </p:txBody>
       </p:sp>
@@ -3843,7 +3860,7 @@
         <p:spPr>
           <a:xfrm>
             <a:off x="509451" y="378822"/>
-            <a:ext cx="1449436" cy="369332"/>
+            <a:ext cx="1920269" cy="369332"/>
           </a:xfrm>
           <a:prstGeom prst="rect">
             <a:avLst/>
@@ -3858,7 +3875,7 @@
           <a:p>
             <a:r>
               <a:rPr lang="pt-BR" dirty="0" smtClean="0"/>
-              <a:t>Maria Joanna</a:t>
+              <a:t>Alessandro Guerra</a:t>
             </a:r>
             <a:endParaRPr lang="pt-BR" dirty="0"/>
           </a:p>
@@ -3934,7 +3951,744 @@
         </p:nvSpPr>
         <p:spPr bwMode="auto">
           <a:xfrm>
-            <a:off x="4997893" y="6526775"/>
+            <a:off x="155575" y="-144463"/>
+            <a:ext cx="304800" cy="304801"/>
+          </a:xfrm>
+          <a:prstGeom prst="rect">
+            <a:avLst/>
+          </a:prstGeom>
+          <a:noFill/>
+          <a:extLst>
+            <a:ext uri="{909E8E84-426E-40DD-AFC4-6F175D3DCCD1}">
+              <a14:hiddenFill xmlns:a14="http://schemas.microsoft.com/office/drawing/2010/main">
+                <a:solidFill>
+                  <a:srgbClr val="FFFFFF"/>
+                </a:solidFill>
+              </a14:hiddenFill>
+            </a:ext>
+          </a:extLst>
+        </p:spPr>
+        <p:txBody>
+          <a:bodyPr vert="horz" wrap="square" lIns="91440" tIns="45720" rIns="91440" bIns="45720" numCol="1" anchor="t" anchorCtr="0" compatLnSpc="1">
+            <a:prstTxWarp prst="textNoShape">
+              <a:avLst/>
+            </a:prstTxWarp>
+          </a:bodyPr>
+          <a:lstStyle/>
+          <a:p>
+            <a:endParaRPr lang="pt-BR"/>
+          </a:p>
+        </p:txBody>
+      </p:sp>
+      <p:sp>
+        <p:nvSpPr>
+          <p:cNvPr id="12" name="AutoShape 4" descr="Sérgio Reis - Home | Facebook"/>
+          <p:cNvSpPr>
+            <a:spLocks noChangeAspect="1" noChangeArrowheads="1"/>
+          </p:cNvSpPr>
+          <p:nvPr/>
+        </p:nvSpPr>
+        <p:spPr bwMode="auto">
+          <a:xfrm>
+            <a:off x="4410065" y="687281"/>
+            <a:ext cx="3454128" cy="1693382"/>
+          </a:xfrm>
+          <a:prstGeom prst="rect">
+            <a:avLst/>
+          </a:prstGeom>
+          <a:noFill/>
+          <a:extLst>
+            <a:ext uri="{909E8E84-426E-40DD-AFC4-6F175D3DCCD1}">
+              <a14:hiddenFill xmlns:a14="http://schemas.microsoft.com/office/drawing/2010/main">
+                <a:solidFill>
+                  <a:srgbClr val="FFFFFF"/>
+                </a:solidFill>
+              </a14:hiddenFill>
+            </a:ext>
+          </a:extLst>
+        </p:spPr>
+        <p:txBody>
+          <a:bodyPr vert="horz" wrap="square" lIns="91440" tIns="45720" rIns="91440" bIns="45720" numCol="1" anchor="t" anchorCtr="0" compatLnSpc="1">
+            <a:prstTxWarp prst="textNoShape">
+              <a:avLst/>
+            </a:prstTxWarp>
+          </a:bodyPr>
+          <a:lstStyle/>
+          <a:p>
+            <a:r>
+              <a:rPr lang="pt-BR" dirty="0" smtClean="0"/>
+              <a:t>3</a:t>
+            </a:r>
+            <a:r>
+              <a:rPr lang="pt-BR" dirty="0"/>
+              <a:t>4</a:t>
+            </a:r>
+            <a:r>
+              <a:rPr lang="pt-BR" dirty="0" smtClean="0"/>
+              <a:t> </a:t>
+            </a:r>
+            <a:r>
+              <a:rPr lang="pt-BR" dirty="0" smtClean="0"/>
+              <a:t>anos</a:t>
+            </a:r>
+          </a:p>
+          <a:p>
+            <a:r>
+              <a:rPr lang="pt-BR" dirty="0" smtClean="0"/>
+              <a:t>Casado</a:t>
+            </a:r>
+          </a:p>
+          <a:p>
+            <a:r>
+              <a:rPr lang="pt-BR" dirty="0" smtClean="0"/>
+              <a:t>Gerente de Processos</a:t>
+            </a:r>
+            <a:endParaRPr lang="pt-BR" dirty="0" smtClean="0"/>
+          </a:p>
+          <a:p>
+            <a:r>
+              <a:rPr lang="pt-BR" dirty="0" smtClean="0"/>
+              <a:t>MBA em Gestão de Tecnologia</a:t>
+            </a:r>
+            <a:endParaRPr lang="pt-BR" dirty="0" smtClean="0"/>
+          </a:p>
+          <a:p>
+            <a:endParaRPr lang="pt-BR" dirty="0" smtClean="0"/>
+          </a:p>
+        </p:txBody>
+      </p:sp>
+      <p:sp>
+        <p:nvSpPr>
+          <p:cNvPr id="14" name="AutoShape 4" descr="Sérgio Reis - Home | Facebook"/>
+          <p:cNvSpPr>
+            <a:spLocks noChangeAspect="1" noChangeArrowheads="1"/>
+          </p:cNvSpPr>
+          <p:nvPr/>
+        </p:nvSpPr>
+        <p:spPr bwMode="auto">
+          <a:xfrm>
+            <a:off x="710992" y="3065889"/>
+            <a:ext cx="3454128" cy="1693382"/>
+          </a:xfrm>
+          <a:prstGeom prst="rect">
+            <a:avLst/>
+          </a:prstGeom>
+          <a:noFill/>
+          <a:extLst>
+            <a:ext uri="{909E8E84-426E-40DD-AFC4-6F175D3DCCD1}">
+              <a14:hiddenFill xmlns:a14="http://schemas.microsoft.com/office/drawing/2010/main">
+                <a:solidFill>
+                  <a:srgbClr val="FFFFFF"/>
+                </a:solidFill>
+              </a14:hiddenFill>
+            </a:ext>
+          </a:extLst>
+        </p:spPr>
+        <p:txBody>
+          <a:bodyPr vert="horz" wrap="square" lIns="91440" tIns="45720" rIns="91440" bIns="45720" numCol="1" anchor="t" anchorCtr="0" compatLnSpc="1">
+            <a:prstTxWarp prst="textNoShape">
+              <a:avLst/>
+            </a:prstTxWarp>
+          </a:bodyPr>
+          <a:lstStyle/>
+          <a:p>
+            <a:pPr marL="285750" indent="-285750">
+              <a:buFont typeface="Courier New" panose="02070309020205020404" pitchFamily="49" charset="0"/>
+              <a:buChar char="o"/>
+            </a:pPr>
+            <a:r>
+              <a:rPr lang="pt-BR" dirty="0" smtClean="0"/>
+              <a:t>Baixo desempenho</a:t>
+            </a:r>
+          </a:p>
+          <a:p>
+            <a:pPr marL="285750" indent="-285750">
+              <a:buFont typeface="Courier New" panose="02070309020205020404" pitchFamily="49" charset="0"/>
+              <a:buChar char="o"/>
+            </a:pPr>
+            <a:r>
+              <a:rPr lang="pt-BR" dirty="0" smtClean="0"/>
+              <a:t>Recorrência de problemas</a:t>
+            </a:r>
+          </a:p>
+          <a:p>
+            <a:pPr marL="285750" indent="-285750">
+              <a:buFont typeface="Courier New" panose="02070309020205020404" pitchFamily="49" charset="0"/>
+              <a:buChar char="o"/>
+            </a:pPr>
+            <a:r>
+              <a:rPr lang="pt-BR" dirty="0" smtClean="0"/>
+              <a:t>Falhas de processo</a:t>
+            </a:r>
+          </a:p>
+          <a:p>
+            <a:pPr marL="285750" indent="-285750">
+              <a:buFont typeface="Courier New" panose="02070309020205020404" pitchFamily="49" charset="0"/>
+              <a:buChar char="o"/>
+            </a:pPr>
+            <a:r>
+              <a:rPr lang="pt-BR" dirty="0" smtClean="0"/>
+              <a:t>Configurações gráficas</a:t>
+            </a:r>
+          </a:p>
+          <a:p>
+            <a:pPr marL="285750" indent="-285750">
+              <a:buFont typeface="Courier New" panose="02070309020205020404" pitchFamily="49" charset="0"/>
+              <a:buChar char="o"/>
+            </a:pPr>
+            <a:r>
+              <a:rPr lang="pt-BR" dirty="0" smtClean="0"/>
+              <a:t>Baixo volume de comunicação</a:t>
+            </a:r>
+          </a:p>
+          <a:p>
+            <a:pPr marL="285750" indent="-285750">
+              <a:buFont typeface="Courier New" panose="02070309020205020404" pitchFamily="49" charset="0"/>
+              <a:buChar char="o"/>
+            </a:pPr>
+            <a:endParaRPr lang="pt-BR" dirty="0"/>
+          </a:p>
+        </p:txBody>
+      </p:sp>
+      <p:sp>
+        <p:nvSpPr>
+          <p:cNvPr id="16" name="Retângulo 15"/>
+          <p:cNvSpPr/>
+          <p:nvPr/>
+        </p:nvSpPr>
+        <p:spPr>
+          <a:xfrm>
+            <a:off x="6923314" y="2639331"/>
+            <a:ext cx="4506686" cy="3839845"/>
+          </a:xfrm>
+          <a:prstGeom prst="rect">
+            <a:avLst/>
+          </a:prstGeom>
+        </p:spPr>
+        <p:style>
+          <a:lnRef idx="2">
+            <a:schemeClr val="accent6"/>
+          </a:lnRef>
+          <a:fillRef idx="1">
+            <a:schemeClr val="lt1"/>
+          </a:fillRef>
+          <a:effectRef idx="0">
+            <a:schemeClr val="accent6"/>
+          </a:effectRef>
+          <a:fontRef idx="minor">
+            <a:schemeClr val="dk1"/>
+          </a:fontRef>
+        </p:style>
+        <p:txBody>
+          <a:bodyPr rtlCol="0" anchor="ctr"/>
+          <a:lstStyle/>
+          <a:p>
+            <a:pPr algn="ctr"/>
+            <a:endParaRPr lang="pt-BR" dirty="0"/>
+          </a:p>
+        </p:txBody>
+      </p:sp>
+      <p:sp>
+        <p:nvSpPr>
+          <p:cNvPr id="17" name="CaixaDeTexto 16"/>
+          <p:cNvSpPr txBox="1"/>
+          <p:nvPr/>
+        </p:nvSpPr>
+        <p:spPr>
+          <a:xfrm>
+            <a:off x="6923314" y="2636967"/>
+            <a:ext cx="1576714" cy="369332"/>
+          </a:xfrm>
+          <a:prstGeom prst="rect">
+            <a:avLst/>
+          </a:prstGeom>
+          <a:noFill/>
+        </p:spPr>
+        <p:txBody>
+          <a:bodyPr wrap="none" rtlCol="0">
+            <a:spAutoFit/>
+          </a:bodyPr>
+          <a:lstStyle/>
+          <a:p>
+            <a:r>
+              <a:rPr lang="pt-BR" dirty="0" smtClean="0"/>
+              <a:t>NECESSIDADES</a:t>
+            </a:r>
+            <a:endParaRPr lang="pt-BR" dirty="0"/>
+          </a:p>
+        </p:txBody>
+      </p:sp>
+      <p:sp>
+        <p:nvSpPr>
+          <p:cNvPr id="18" name="AutoShape 4" descr="Sérgio Reis - Home | Facebook"/>
+          <p:cNvSpPr>
+            <a:spLocks noChangeAspect="1" noChangeArrowheads="1"/>
+          </p:cNvSpPr>
+          <p:nvPr/>
+        </p:nvSpPr>
+        <p:spPr bwMode="auto">
+          <a:xfrm>
+            <a:off x="7033415" y="3006298"/>
+            <a:ext cx="3454128" cy="1957587"/>
+          </a:xfrm>
+          <a:prstGeom prst="rect">
+            <a:avLst/>
+          </a:prstGeom>
+          <a:noFill/>
+          <a:extLst>
+            <a:ext uri="{909E8E84-426E-40DD-AFC4-6F175D3DCCD1}">
+              <a14:hiddenFill xmlns:a14="http://schemas.microsoft.com/office/drawing/2010/main">
+                <a:solidFill>
+                  <a:srgbClr val="FFFFFF"/>
+                </a:solidFill>
+              </a14:hiddenFill>
+            </a:ext>
+          </a:extLst>
+        </p:spPr>
+        <p:txBody>
+          <a:bodyPr vert="horz" wrap="square" lIns="91440" tIns="45720" rIns="91440" bIns="45720" numCol="1" anchor="t" anchorCtr="0" compatLnSpc="1">
+            <a:prstTxWarp prst="textNoShape">
+              <a:avLst/>
+            </a:prstTxWarp>
+          </a:bodyPr>
+          <a:lstStyle/>
+          <a:p>
+            <a:pPr marL="285750" indent="-285750">
+              <a:buFont typeface="Courier New" panose="02070309020205020404" pitchFamily="49" charset="0"/>
+              <a:buChar char="o"/>
+            </a:pPr>
+            <a:r>
+              <a:rPr lang="pt-BR" dirty="0" smtClean="0"/>
+              <a:t>Saber parâmetros dos problemas mais reincidentes</a:t>
+            </a:r>
+          </a:p>
+          <a:p>
+            <a:pPr marL="285750" indent="-285750">
+              <a:buFont typeface="Courier New" panose="02070309020205020404" pitchFamily="49" charset="0"/>
+              <a:buChar char="o"/>
+            </a:pPr>
+            <a:r>
+              <a:rPr lang="pt-BR" dirty="0" smtClean="0"/>
+              <a:t>Tempo médio das manutenções</a:t>
+            </a:r>
+          </a:p>
+          <a:p>
+            <a:pPr marL="285750" indent="-285750">
+              <a:buFont typeface="Courier New" panose="02070309020205020404" pitchFamily="49" charset="0"/>
+              <a:buChar char="o"/>
+            </a:pPr>
+            <a:r>
+              <a:rPr lang="pt-BR" dirty="0" smtClean="0"/>
+              <a:t>Periodicidade de falhas</a:t>
+            </a:r>
+          </a:p>
+          <a:p>
+            <a:pPr marL="285750" indent="-285750">
+              <a:buFont typeface="Courier New" panose="02070309020205020404" pitchFamily="49" charset="0"/>
+              <a:buChar char="o"/>
+            </a:pPr>
+            <a:r>
+              <a:rPr lang="pt-BR" dirty="0" smtClean="0"/>
+              <a:t>Visualização gráfica</a:t>
+            </a:r>
+          </a:p>
+          <a:p>
+            <a:pPr marL="285750" indent="-285750">
+              <a:buFont typeface="Courier New" panose="02070309020205020404" pitchFamily="49" charset="0"/>
+              <a:buChar char="o"/>
+            </a:pPr>
+            <a:r>
+              <a:rPr lang="pt-BR" dirty="0" smtClean="0"/>
+              <a:t>Comunicação por alertas</a:t>
+            </a:r>
+          </a:p>
+          <a:p>
+            <a:pPr marL="285750" indent="-285750">
+              <a:buFont typeface="Courier New" panose="02070309020205020404" pitchFamily="49" charset="0"/>
+              <a:buChar char="o"/>
+            </a:pPr>
+            <a:endParaRPr lang="pt-BR" dirty="0" smtClean="0"/>
+          </a:p>
+          <a:p>
+            <a:pPr marL="285750" indent="-285750">
+              <a:buFont typeface="Courier New" panose="02070309020205020404" pitchFamily="49" charset="0"/>
+              <a:buChar char="o"/>
+            </a:pPr>
+            <a:endParaRPr lang="pt-BR" dirty="0"/>
+          </a:p>
+        </p:txBody>
+      </p:sp>
+      <p:sp>
+        <p:nvSpPr>
+          <p:cNvPr id="20" name="AutoShape 2" descr="Sérgio Reis - Home | Facebook"/>
+          <p:cNvSpPr>
+            <a:spLocks noChangeAspect="1" noChangeArrowheads="1"/>
+          </p:cNvSpPr>
+          <p:nvPr/>
+        </p:nvSpPr>
+        <p:spPr bwMode="auto">
+          <a:xfrm>
+            <a:off x="4467084" y="6518997"/>
+            <a:ext cx="3257833" cy="462921"/>
+          </a:xfrm>
+          <a:prstGeom prst="rect">
+            <a:avLst/>
+          </a:prstGeom>
+          <a:noFill/>
+          <a:extLst>
+            <a:ext uri="{909E8E84-426E-40DD-AFC4-6F175D3DCCD1}">
+              <a14:hiddenFill xmlns:a14="http://schemas.microsoft.com/office/drawing/2010/main">
+                <a:solidFill>
+                  <a:srgbClr val="FFFFFF"/>
+                </a:solidFill>
+              </a14:hiddenFill>
+            </a:ext>
+          </a:extLst>
+        </p:spPr>
+        <p:txBody>
+          <a:bodyPr vert="horz" wrap="square" lIns="91440" tIns="45720" rIns="91440" bIns="45720" numCol="1" anchor="t" anchorCtr="0" compatLnSpc="1">
+            <a:prstTxWarp prst="textNoShape">
+              <a:avLst/>
+            </a:prstTxWarp>
+          </a:bodyPr>
+          <a:lstStyle/>
+          <a:p>
+            <a:r>
+              <a:rPr lang="pt-BR" dirty="0" smtClean="0"/>
+              <a:t>Área de TI do </a:t>
+            </a:r>
+            <a:r>
+              <a:rPr lang="pt-BR" dirty="0" err="1" smtClean="0"/>
+              <a:t>SixMind</a:t>
+            </a:r>
+            <a:r>
+              <a:rPr lang="pt-BR" dirty="0" smtClean="0"/>
+              <a:t> (Gerente)</a:t>
+            </a:r>
+            <a:endParaRPr lang="pt-BR" dirty="0"/>
+          </a:p>
+        </p:txBody>
+      </p:sp>
+      <p:pic>
+        <p:nvPicPr>
+          <p:cNvPr id="6" name="Imagem 5" descr="&lt;strong&gt;Gerente&lt;/strong&gt; General División El Teniente, Andrés Music | Flickr"/>
+          <p:cNvPicPr>
+            <a:picLocks noChangeAspect="1"/>
+          </p:cNvPicPr>
+          <p:nvPr/>
+        </p:nvPicPr>
+        <p:blipFill>
+          <a:blip r:embed="rId2">
+            <a:extLst>
+              <a:ext uri="{28A0092B-C50C-407E-A947-70E740481C1C}">
+                <a14:useLocalDpi xmlns:a14="http://schemas.microsoft.com/office/drawing/2010/main" val="0"/>
+              </a:ext>
+            </a:extLst>
+          </a:blip>
+          <a:stretch>
+            <a:fillRect/>
+          </a:stretch>
+        </p:blipFill>
+        <p:spPr>
+          <a:xfrm>
+            <a:off x="2521439" y="569879"/>
+            <a:ext cx="1256866" cy="1882348"/>
+          </a:xfrm>
+          <a:prstGeom prst="rect">
+            <a:avLst/>
+          </a:prstGeom>
+        </p:spPr>
+      </p:pic>
+    </p:spTree>
+    <p:extLst>
+      <p:ext uri="{BB962C8B-B14F-4D97-AF65-F5344CB8AC3E}">
+        <p14:creationId xmlns:p14="http://schemas.microsoft.com/office/powerpoint/2010/main" val="1374445647"/>
+      </p:ext>
+    </p:extLst>
+  </p:cSld>
+  <p:clrMapOvr>
+    <a:masterClrMapping/>
+  </p:clrMapOvr>
+  <p:timing>
+    <p:tnLst>
+      <p:par>
+        <p:cTn id="1" dur="indefinite" restart="never" nodeType="tmRoot"/>
+      </p:par>
+    </p:tnLst>
+  </p:timing>
+</p:sld>
+</file>
+
+<file path=ppt/slides/slide3.xml><?xml version="1.0" encoding="utf-8"?>
+<p:sld xmlns:a="http://schemas.openxmlformats.org/drawingml/2006/main" xmlns:r="http://schemas.openxmlformats.org/officeDocument/2006/relationships" xmlns:p="http://schemas.openxmlformats.org/presentationml/2006/main">
+  <p:cSld>
+    <p:spTree>
+      <p:nvGrpSpPr>
+        <p:cNvPr id="1" name=""/>
+        <p:cNvGrpSpPr/>
+        <p:nvPr/>
+      </p:nvGrpSpPr>
+      <p:grpSpPr>
+        <a:xfrm>
+          <a:off x="0" y="0"/>
+          <a:ext cx="0" cy="0"/>
+          <a:chOff x="0" y="0"/>
+          <a:chExt cx="0" cy="0"/>
+        </a:xfrm>
+      </p:grpSpPr>
+      <p:sp>
+        <p:nvSpPr>
+          <p:cNvPr id="2" name="Título 1"/>
+          <p:cNvSpPr>
+            <a:spLocks noGrp="1"/>
+          </p:cNvSpPr>
+          <p:nvPr>
+            <p:ph type="ctrTitle"/>
+          </p:nvPr>
+        </p:nvSpPr>
+        <p:spPr/>
+        <p:txBody>
+          <a:bodyPr/>
+          <a:lstStyle/>
+          <a:p>
+            <a:endParaRPr lang="pt-BR"/>
+          </a:p>
+        </p:txBody>
+      </p:sp>
+      <p:sp>
+        <p:nvSpPr>
+          <p:cNvPr id="3" name="Subtítulo 2"/>
+          <p:cNvSpPr>
+            <a:spLocks noGrp="1"/>
+          </p:cNvSpPr>
+          <p:nvPr>
+            <p:ph type="subTitle" idx="1"/>
+          </p:nvPr>
+        </p:nvSpPr>
+        <p:spPr/>
+        <p:txBody>
+          <a:bodyPr/>
+          <a:lstStyle/>
+          <a:p>
+            <a:endParaRPr lang="pt-BR"/>
+          </a:p>
+        </p:txBody>
+      </p:sp>
+      <p:sp>
+        <p:nvSpPr>
+          <p:cNvPr id="4" name="Retângulo 3"/>
+          <p:cNvSpPr/>
+          <p:nvPr/>
+        </p:nvSpPr>
+        <p:spPr>
+          <a:xfrm>
+            <a:off x="509452" y="378823"/>
+            <a:ext cx="3709852" cy="2168434"/>
+          </a:xfrm>
+          <a:prstGeom prst="rect">
+            <a:avLst/>
+          </a:prstGeom>
+        </p:spPr>
+        <p:style>
+          <a:lnRef idx="2">
+            <a:schemeClr val="accent6"/>
+          </a:lnRef>
+          <a:fillRef idx="1">
+            <a:schemeClr val="lt1"/>
+          </a:fillRef>
+          <a:effectRef idx="0">
+            <a:schemeClr val="accent6"/>
+          </a:effectRef>
+          <a:fontRef idx="minor">
+            <a:schemeClr val="dk1"/>
+          </a:fontRef>
+        </p:style>
+        <p:txBody>
+          <a:bodyPr rtlCol="0" anchor="ctr"/>
+          <a:lstStyle/>
+          <a:p>
+            <a:pPr algn="ctr"/>
+            <a:endParaRPr lang="pt-BR" dirty="0"/>
+          </a:p>
+        </p:txBody>
+      </p:sp>
+      <p:sp>
+        <p:nvSpPr>
+          <p:cNvPr id="5" name="Retângulo 4"/>
+          <p:cNvSpPr/>
+          <p:nvPr/>
+        </p:nvSpPr>
+        <p:spPr>
+          <a:xfrm>
+            <a:off x="509451" y="2639331"/>
+            <a:ext cx="6322423" cy="3839845"/>
+          </a:xfrm>
+          <a:prstGeom prst="rect">
+            <a:avLst/>
+          </a:prstGeom>
+        </p:spPr>
+        <p:style>
+          <a:lnRef idx="2">
+            <a:schemeClr val="accent6"/>
+          </a:lnRef>
+          <a:fillRef idx="1">
+            <a:schemeClr val="lt1"/>
+          </a:fillRef>
+          <a:effectRef idx="0">
+            <a:schemeClr val="accent6"/>
+          </a:effectRef>
+          <a:fontRef idx="minor">
+            <a:schemeClr val="dk1"/>
+          </a:fontRef>
+        </p:style>
+        <p:txBody>
+          <a:bodyPr rtlCol="0" anchor="ctr"/>
+          <a:lstStyle/>
+          <a:p>
+            <a:pPr algn="ctr"/>
+            <a:endParaRPr lang="pt-BR" dirty="0"/>
+          </a:p>
+        </p:txBody>
+      </p:sp>
+      <p:sp>
+        <p:nvSpPr>
+          <p:cNvPr id="7" name="Retângulo 6"/>
+          <p:cNvSpPr/>
+          <p:nvPr/>
+        </p:nvSpPr>
+        <p:spPr>
+          <a:xfrm>
+            <a:off x="4345578" y="378822"/>
+            <a:ext cx="7084422" cy="2168434"/>
+          </a:xfrm>
+          <a:prstGeom prst="rect">
+            <a:avLst/>
+          </a:prstGeom>
+        </p:spPr>
+        <p:style>
+          <a:lnRef idx="2">
+            <a:schemeClr val="accent6"/>
+          </a:lnRef>
+          <a:fillRef idx="1">
+            <a:schemeClr val="lt1"/>
+          </a:fillRef>
+          <a:effectRef idx="0">
+            <a:schemeClr val="accent6"/>
+          </a:effectRef>
+          <a:fontRef idx="minor">
+            <a:schemeClr val="dk1"/>
+          </a:fontRef>
+        </p:style>
+        <p:txBody>
+          <a:bodyPr rtlCol="0" anchor="ctr"/>
+          <a:lstStyle/>
+          <a:p>
+            <a:pPr algn="ctr"/>
+            <a:endParaRPr lang="pt-BR"/>
+          </a:p>
+        </p:txBody>
+      </p:sp>
+      <p:sp>
+        <p:nvSpPr>
+          <p:cNvPr id="8" name="CaixaDeTexto 7"/>
+          <p:cNvSpPr txBox="1"/>
+          <p:nvPr/>
+        </p:nvSpPr>
+        <p:spPr>
+          <a:xfrm>
+            <a:off x="509451" y="378822"/>
+            <a:ext cx="1449436" cy="369332"/>
+          </a:xfrm>
+          <a:prstGeom prst="rect">
+            <a:avLst/>
+          </a:prstGeom>
+          <a:noFill/>
+        </p:spPr>
+        <p:txBody>
+          <a:bodyPr wrap="none" rtlCol="0">
+            <a:spAutoFit/>
+          </a:bodyPr>
+          <a:lstStyle/>
+          <a:p>
+            <a:r>
+              <a:rPr lang="pt-BR" dirty="0" smtClean="0"/>
+              <a:t>Maria Joanna</a:t>
+            </a:r>
+            <a:endParaRPr lang="pt-BR" dirty="0"/>
+          </a:p>
+        </p:txBody>
+      </p:sp>
+      <p:sp>
+        <p:nvSpPr>
+          <p:cNvPr id="9" name="CaixaDeTexto 8"/>
+          <p:cNvSpPr txBox="1"/>
+          <p:nvPr/>
+        </p:nvSpPr>
+        <p:spPr>
+          <a:xfrm>
+            <a:off x="4345578" y="378822"/>
+            <a:ext cx="1992853" cy="369332"/>
+          </a:xfrm>
+          <a:prstGeom prst="rect">
+            <a:avLst/>
+          </a:prstGeom>
+          <a:noFill/>
+        </p:spPr>
+        <p:txBody>
+          <a:bodyPr wrap="none" rtlCol="0">
+            <a:spAutoFit/>
+          </a:bodyPr>
+          <a:lstStyle/>
+          <a:p>
+            <a:r>
+              <a:rPr lang="pt-BR" dirty="0" smtClean="0"/>
+              <a:t>COMPORTAMENTO</a:t>
+            </a:r>
+            <a:endParaRPr lang="pt-BR" dirty="0"/>
+          </a:p>
+        </p:txBody>
+      </p:sp>
+      <p:sp>
+        <p:nvSpPr>
+          <p:cNvPr id="10" name="CaixaDeTexto 9"/>
+          <p:cNvSpPr txBox="1"/>
+          <p:nvPr/>
+        </p:nvSpPr>
+        <p:spPr>
+          <a:xfrm>
+            <a:off x="509451" y="2636967"/>
+            <a:ext cx="820417" cy="369332"/>
+          </a:xfrm>
+          <a:prstGeom prst="rect">
+            <a:avLst/>
+          </a:prstGeom>
+          <a:noFill/>
+        </p:spPr>
+        <p:txBody>
+          <a:bodyPr wrap="none" rtlCol="0">
+            <a:spAutoFit/>
+          </a:bodyPr>
+          <a:lstStyle/>
+          <a:p>
+            <a:r>
+              <a:rPr lang="pt-BR" dirty="0" smtClean="0"/>
+              <a:t>DORES</a:t>
+            </a:r>
+            <a:endParaRPr lang="pt-BR" dirty="0"/>
+          </a:p>
+        </p:txBody>
+      </p:sp>
+      <p:sp>
+        <p:nvSpPr>
+          <p:cNvPr id="11" name="AutoShape 2" descr="Sérgio Reis - Home | Facebook"/>
+          <p:cNvSpPr>
+            <a:spLocks noChangeAspect="1" noChangeArrowheads="1"/>
+          </p:cNvSpPr>
+          <p:nvPr/>
+        </p:nvSpPr>
+        <p:spPr bwMode="auto">
+          <a:xfrm>
+            <a:off x="4956764" y="6526775"/>
             <a:ext cx="2278472" cy="462921"/>
           </a:xfrm>
           <a:prstGeom prst="rect">
@@ -4118,6 +4872,18 @@
               <a:rPr lang="pt-BR" dirty="0" smtClean="0"/>
               <a:t>Falta de ferramenta visual </a:t>
             </a:r>
+            <a:endParaRPr lang="pt-BR" dirty="0" smtClean="0"/>
+          </a:p>
+          <a:p>
+            <a:pPr marL="285750" indent="-285750">
+              <a:buFont typeface="Courier New" panose="02070309020205020404" pitchFamily="49" charset="0"/>
+              <a:buChar char="o"/>
+            </a:pPr>
+            <a:r>
+              <a:rPr lang="pt-BR" dirty="0" smtClean="0"/>
+              <a:t>Acesso pouco prático</a:t>
+            </a:r>
+            <a:endParaRPr lang="pt-BR" dirty="0" smtClean="0"/>
           </a:p>
           <a:p>
             <a:pPr marL="285750" indent="-285750">
@@ -4354,8 +5120,23 @@
             </a:pPr>
             <a:r>
               <a:rPr lang="pt-BR" dirty="0" smtClean="0"/>
-              <a:t>Ferramenta visual</a:t>
-            </a:r>
+              <a:t>Ferramenta </a:t>
+            </a:r>
+            <a:r>
+              <a:rPr lang="pt-BR" dirty="0" smtClean="0"/>
+              <a:t>visual</a:t>
+            </a:r>
+          </a:p>
+          <a:p>
+            <a:pPr marL="285750" indent="-285750">
+              <a:buFont typeface="Courier New" panose="02070309020205020404" pitchFamily="49" charset="0"/>
+              <a:buChar char="o"/>
+            </a:pPr>
+            <a:r>
+              <a:rPr lang="pt-BR" dirty="0" smtClean="0"/>
+              <a:t>Plataforma em nuvem</a:t>
+            </a:r>
+            <a:endParaRPr lang="pt-BR" dirty="0" smtClean="0"/>
           </a:p>
           <a:p>
             <a:pPr marL="285750" indent="-285750">
@@ -4376,6 +5157,13 @@
   <p:clrMapOvr>
     <a:masterClrMapping/>
   </p:clrMapOvr>
+  <p:timing>
+    <p:tnLst>
+      <p:par>
+        <p:cTn id="1" dur="indefinite" restart="never" nodeType="tmRoot"/>
+      </p:par>
+    </p:tnLst>
+  </p:timing>
 </p:sld>
 </file>
 

</xml_diff>

<commit_message>
Alteração no User Stories e Persona
</commit_message>
<xml_diff>
--- a/Projeto SIX MIND/Documentação/Persona.pptx
+++ b/Projeto SIX MIND/Documentação/Persona.pptx
@@ -5,8 +5,8 @@
     <p:sldMasterId id="2147483648" r:id="rId1"/>
   </p:sldMasterIdLst>
   <p:sldIdLst>
-    <p:sldId id="256" r:id="rId2"/>
-    <p:sldId id="258" r:id="rId3"/>
+    <p:sldId id="258" r:id="rId2"/>
+    <p:sldId id="256" r:id="rId3"/>
     <p:sldId id="257" r:id="rId4"/>
   </p:sldIdLst>
   <p:sldSz cx="12192000" cy="6858000"/>
@@ -245,7 +245,7 @@
           <a:p>
             <a:fld id="{CC6831E4-0DA0-44A1-AED6-DAEB15BE7357}" type="datetimeFigureOut">
               <a:rPr lang="pt-BR" smtClean="0"/>
-              <a:t>01/09/2020</a:t>
+              <a:t>02/09/2020</a:t>
             </a:fld>
             <a:endParaRPr lang="pt-BR"/>
           </a:p>
@@ -415,7 +415,7 @@
           <a:p>
             <a:fld id="{CC6831E4-0DA0-44A1-AED6-DAEB15BE7357}" type="datetimeFigureOut">
               <a:rPr lang="pt-BR" smtClean="0"/>
-              <a:t>01/09/2020</a:t>
+              <a:t>02/09/2020</a:t>
             </a:fld>
             <a:endParaRPr lang="pt-BR"/>
           </a:p>
@@ -595,7 +595,7 @@
           <a:p>
             <a:fld id="{CC6831E4-0DA0-44A1-AED6-DAEB15BE7357}" type="datetimeFigureOut">
               <a:rPr lang="pt-BR" smtClean="0"/>
-              <a:t>01/09/2020</a:t>
+              <a:t>02/09/2020</a:t>
             </a:fld>
             <a:endParaRPr lang="pt-BR"/>
           </a:p>
@@ -765,7 +765,7 @@
           <a:p>
             <a:fld id="{CC6831E4-0DA0-44A1-AED6-DAEB15BE7357}" type="datetimeFigureOut">
               <a:rPr lang="pt-BR" smtClean="0"/>
-              <a:t>01/09/2020</a:t>
+              <a:t>02/09/2020</a:t>
             </a:fld>
             <a:endParaRPr lang="pt-BR"/>
           </a:p>
@@ -1011,7 +1011,7 @@
           <a:p>
             <a:fld id="{CC6831E4-0DA0-44A1-AED6-DAEB15BE7357}" type="datetimeFigureOut">
               <a:rPr lang="pt-BR" smtClean="0"/>
-              <a:t>01/09/2020</a:t>
+              <a:t>02/09/2020</a:t>
             </a:fld>
             <a:endParaRPr lang="pt-BR"/>
           </a:p>
@@ -1243,7 +1243,7 @@
           <a:p>
             <a:fld id="{CC6831E4-0DA0-44A1-AED6-DAEB15BE7357}" type="datetimeFigureOut">
               <a:rPr lang="pt-BR" smtClean="0"/>
-              <a:t>01/09/2020</a:t>
+              <a:t>02/09/2020</a:t>
             </a:fld>
             <a:endParaRPr lang="pt-BR"/>
           </a:p>
@@ -1610,7 +1610,7 @@
           <a:p>
             <a:fld id="{CC6831E4-0DA0-44A1-AED6-DAEB15BE7357}" type="datetimeFigureOut">
               <a:rPr lang="pt-BR" smtClean="0"/>
-              <a:t>01/09/2020</a:t>
+              <a:t>02/09/2020</a:t>
             </a:fld>
             <a:endParaRPr lang="pt-BR"/>
           </a:p>
@@ -1728,7 +1728,7 @@
           <a:p>
             <a:fld id="{CC6831E4-0DA0-44A1-AED6-DAEB15BE7357}" type="datetimeFigureOut">
               <a:rPr lang="pt-BR" smtClean="0"/>
-              <a:t>01/09/2020</a:t>
+              <a:t>02/09/2020</a:t>
             </a:fld>
             <a:endParaRPr lang="pt-BR"/>
           </a:p>
@@ -1823,7 +1823,7 @@
           <a:p>
             <a:fld id="{CC6831E4-0DA0-44A1-AED6-DAEB15BE7357}" type="datetimeFigureOut">
               <a:rPr lang="pt-BR" smtClean="0"/>
-              <a:t>01/09/2020</a:t>
+              <a:t>02/09/2020</a:t>
             </a:fld>
             <a:endParaRPr lang="pt-BR"/>
           </a:p>
@@ -2100,7 +2100,7 @@
           <a:p>
             <a:fld id="{CC6831E4-0DA0-44A1-AED6-DAEB15BE7357}" type="datetimeFigureOut">
               <a:rPr lang="pt-BR" smtClean="0"/>
-              <a:t>01/09/2020</a:t>
+              <a:t>02/09/2020</a:t>
             </a:fld>
             <a:endParaRPr lang="pt-BR"/>
           </a:p>
@@ -2353,7 +2353,7 @@
           <a:p>
             <a:fld id="{CC6831E4-0DA0-44A1-AED6-DAEB15BE7357}" type="datetimeFigureOut">
               <a:rPr lang="pt-BR" smtClean="0"/>
-              <a:t>01/09/2020</a:t>
+              <a:t>02/09/2020</a:t>
             </a:fld>
             <a:endParaRPr lang="pt-BR"/>
           </a:p>
@@ -2566,7 +2566,7 @@
           <a:p>
             <a:fld id="{CC6831E4-0DA0-44A1-AED6-DAEB15BE7357}" type="datetimeFigureOut">
               <a:rPr lang="pt-BR" smtClean="0"/>
-              <a:t>01/09/2020</a:t>
+              <a:t>02/09/2020</a:t>
             </a:fld>
             <a:endParaRPr lang="pt-BR"/>
           </a:p>
@@ -3132,7 +3132,7 @@
         <p:spPr>
           <a:xfrm>
             <a:off x="509451" y="378822"/>
-            <a:ext cx="1674946" cy="369332"/>
+            <a:ext cx="1920269" cy="369332"/>
           </a:xfrm>
           <a:prstGeom prst="rect">
             <a:avLst/>
@@ -3147,7 +3147,7 @@
           <a:p>
             <a:r>
               <a:rPr lang="pt-BR" dirty="0" smtClean="0"/>
-              <a:t>Kleber Matheus</a:t>
+              <a:t>Alessandro Guerra</a:t>
             </a:r>
             <a:endParaRPr lang="pt-BR" dirty="0"/>
           </a:p>
@@ -3293,7 +3293,7 @@
             </a:r>
             <a:r>
               <a:rPr lang="pt-BR" dirty="0"/>
-              <a:t>3</a:t>
+              <a:t>4</a:t>
             </a:r>
             <a:r>
               <a:rPr lang="pt-BR" dirty="0" smtClean="0"/>
@@ -3309,13 +3309,13 @@
           <a:p>
             <a:r>
               <a:rPr lang="pt-BR" dirty="0" smtClean="0"/>
-              <a:t>Analista de Sistemas</a:t>
-            </a:r>
-          </a:p>
-          <a:p>
-            <a:r>
-              <a:rPr lang="pt-BR" dirty="0" smtClean="0"/>
-              <a:t>Profissional em DBA</a:t>
+              <a:t>Gerente de Processos</a:t>
+            </a:r>
+          </a:p>
+          <a:p>
+            <a:r>
+              <a:rPr lang="pt-BR" dirty="0" smtClean="0"/>
+              <a:t>MBA em Gestão de Tecnologia</a:t>
             </a:r>
           </a:p>
           <a:p>
@@ -3364,7 +3364,7 @@
             </a:pPr>
             <a:r>
               <a:rPr lang="pt-BR" dirty="0" smtClean="0"/>
-              <a:t>Máquina com lentidão</a:t>
+              <a:t>Baixo desempenho</a:t>
             </a:r>
           </a:p>
           <a:p>
@@ -3374,7 +3374,7 @@
             </a:pPr>
             <a:r>
               <a:rPr lang="pt-BR" dirty="0" smtClean="0"/>
-              <a:t>CPU com gargalo</a:t>
+              <a:t>Recorrência de problemas</a:t>
             </a:r>
           </a:p>
           <a:p>
@@ -3384,7 +3384,7 @@
             </a:pPr>
             <a:r>
               <a:rPr lang="pt-BR" dirty="0" smtClean="0"/>
-              <a:t>Esgotamento de memória</a:t>
+              <a:t>Falhas de processo</a:t>
             </a:r>
           </a:p>
           <a:p>
@@ -3394,7 +3394,7 @@
             </a:pPr>
             <a:r>
               <a:rPr lang="pt-BR" dirty="0" smtClean="0"/>
-              <a:t>Sobrecarga de sistema</a:t>
+              <a:t>Configurações gráficas</a:t>
             </a:r>
           </a:p>
           <a:p>
@@ -3404,8 +3404,14 @@
             </a:pPr>
             <a:r>
               <a:rPr lang="pt-BR" dirty="0" smtClean="0"/>
-              <a:t>Alta temperatura da máquina</a:t>
-            </a:r>
+              <a:t>Baixo volume de comunicação</a:t>
+            </a:r>
+          </a:p>
+          <a:p>
+            <a:pPr marL="285750" indent="-285750">
+              <a:buFont typeface="Courier New" panose="02070309020205020404" pitchFamily="49" charset="0"/>
+              <a:buChar char="o"/>
+            </a:pPr>
             <a:endParaRPr lang="pt-BR" dirty="0"/>
           </a:p>
         </p:txBody>
@@ -3488,8 +3494,8 @@
         </p:nvSpPr>
         <p:spPr bwMode="auto">
           <a:xfrm>
-            <a:off x="7033415" y="3006299"/>
-            <a:ext cx="3454128" cy="1693382"/>
+            <a:off x="7033415" y="3006298"/>
+            <a:ext cx="3454128" cy="1957587"/>
           </a:xfrm>
           <a:prstGeom prst="rect">
             <a:avLst/>
@@ -3519,7 +3525,7 @@
             </a:pPr>
             <a:r>
               <a:rPr lang="pt-BR" dirty="0" smtClean="0"/>
-              <a:t>Processador melhor</a:t>
+              <a:t>Saber parâmetros dos problemas mais reincidentes</a:t>
             </a:r>
           </a:p>
           <a:p>
@@ -3529,13 +3535,8 @@
             </a:pPr>
             <a:r>
               <a:rPr lang="pt-BR" dirty="0" smtClean="0"/>
-              <a:t>Utilização da </a:t>
-            </a:r>
-            <a:r>
-              <a:rPr lang="pt-BR" dirty="0" err="1" smtClean="0"/>
-              <a:t>cloud</a:t>
-            </a:r>
-            <a:endParaRPr lang="pt-BR" dirty="0" smtClean="0"/>
+              <a:t>Visualização gráfica</a:t>
+            </a:r>
           </a:p>
           <a:p>
             <a:pPr marL="285750" indent="-285750">
@@ -3544,8 +3545,9 @@
             </a:pPr>
             <a:r>
               <a:rPr lang="pt-BR" dirty="0" smtClean="0"/>
-              <a:t>Subdivisão de tarefas</a:t>
-            </a:r>
+              <a:t>Relatórios</a:t>
+            </a:r>
+            <a:endParaRPr lang="pt-BR" dirty="0" smtClean="0"/>
           </a:p>
           <a:p>
             <a:pPr marL="285750" indent="-285750">
@@ -3554,7 +3556,7 @@
             </a:pPr>
             <a:r>
               <a:rPr lang="pt-BR" dirty="0" smtClean="0"/>
-              <a:t>Condicionamento da área</a:t>
+              <a:t>Comunicação por alertas</a:t>
             </a:r>
           </a:p>
           <a:p>
@@ -3562,39 +3564,29 @@
               <a:buFont typeface="Courier New" panose="02070309020205020404" pitchFamily="49" charset="0"/>
               <a:buChar char="o"/>
             </a:pPr>
-            <a:r>
-              <a:rPr lang="pt-BR" dirty="0" smtClean="0"/>
-              <a:t>Ambientação da área de trabalho</a:t>
-            </a:r>
+            <a:endParaRPr lang="pt-BR" dirty="0" smtClean="0"/>
+          </a:p>
+          <a:p>
+            <a:pPr marL="285750" indent="-285750">
+              <a:buFont typeface="Courier New" panose="02070309020205020404" pitchFamily="49" charset="0"/>
+              <a:buChar char="o"/>
+            </a:pPr>
             <a:endParaRPr lang="pt-BR" dirty="0"/>
           </a:p>
         </p:txBody>
       </p:sp>
-      <p:pic>
-        <p:nvPicPr>
-          <p:cNvPr id="1030" name="Picture 6" descr="Vai sobrar emprego para estes 6 profissionais de TI em 2018 | Exame"/>
-          <p:cNvPicPr>
-            <a:picLocks noChangeAspect="1" noChangeArrowheads="1"/>
-          </p:cNvPicPr>
+      <p:sp>
+        <p:nvSpPr>
+          <p:cNvPr id="20" name="AutoShape 2" descr="Sérgio Reis - Home | Facebook"/>
+          <p:cNvSpPr>
+            <a:spLocks noChangeAspect="1" noChangeArrowheads="1"/>
+          </p:cNvSpPr>
           <p:nvPr/>
-        </p:nvPicPr>
-        <p:blipFill>
-          <a:blip r:embed="rId2" cstate="print">
-            <a:extLst>
-              <a:ext uri="{28A0092B-C50C-407E-A947-70E740481C1C}">
-                <a14:useLocalDpi xmlns:a14="http://schemas.microsoft.com/office/drawing/2010/main" val="0"/>
-              </a:ext>
-            </a:extLst>
-          </a:blip>
-          <a:srcRect/>
-          <a:stretch>
-            <a:fillRect/>
-          </a:stretch>
-        </p:blipFill>
+        </p:nvSpPr>
         <p:spPr bwMode="auto">
           <a:xfrm>
-            <a:off x="1329868" y="840228"/>
-            <a:ext cx="2299844" cy="1533230"/>
+            <a:off x="4467084" y="6518997"/>
+            <a:ext cx="3257833" cy="462921"/>
           </a:xfrm>
           <a:prstGeom prst="rect">
             <a:avLst/>
@@ -3610,34 +3602,6 @@
             </a:ext>
           </a:extLst>
         </p:spPr>
-      </p:pic>
-      <p:sp>
-        <p:nvSpPr>
-          <p:cNvPr id="20" name="AutoShape 2" descr="Sérgio Reis - Home | Facebook"/>
-          <p:cNvSpPr>
-            <a:spLocks noChangeAspect="1" noChangeArrowheads="1"/>
-          </p:cNvSpPr>
-          <p:nvPr/>
-        </p:nvSpPr>
-        <p:spPr bwMode="auto">
-          <a:xfrm>
-            <a:off x="4395238" y="6518997"/>
-            <a:ext cx="3401524" cy="462921"/>
-          </a:xfrm>
-          <a:prstGeom prst="rect">
-            <a:avLst/>
-          </a:prstGeom>
-          <a:noFill/>
-          <a:extLst>
-            <a:ext uri="{909E8E84-426E-40DD-AFC4-6F175D3DCCD1}">
-              <a14:hiddenFill xmlns:a14="http://schemas.microsoft.com/office/drawing/2010/main">
-                <a:solidFill>
-                  <a:srgbClr val="FFFFFF"/>
-                </a:solidFill>
-              </a14:hiddenFill>
-            </a:ext>
-          </a:extLst>
-        </p:spPr>
         <p:txBody>
           <a:bodyPr vert="horz" wrap="square" lIns="91440" tIns="45720" rIns="91440" bIns="45720" numCol="1" anchor="t" anchorCtr="0" compatLnSpc="1">
             <a:prstTxWarp prst="textNoShape">
@@ -3656,16 +3620,46 @@
             </a:r>
             <a:r>
               <a:rPr lang="pt-BR" dirty="0" smtClean="0"/>
-              <a:t> (Operação)</a:t>
+              <a:t> (Gerente)</a:t>
             </a:r>
             <a:endParaRPr lang="pt-BR" dirty="0"/>
           </a:p>
         </p:txBody>
       </p:sp>
+      <p:pic>
+        <p:nvPicPr>
+          <p:cNvPr id="6" name="Imagem 5" descr="&lt;strong&gt;Gerente&lt;/strong&gt; General División El Teniente, Andrés Music | Flickr"/>
+          <p:cNvPicPr>
+            <a:picLocks noChangeAspect="1"/>
+          </p:cNvPicPr>
+          <p:nvPr/>
+        </p:nvPicPr>
+        <p:blipFill>
+          <a:blip r:embed="rId2">
+            <a:extLst>
+              <a:ext uri="{28A0092B-C50C-407E-A947-70E740481C1C}">
+                <a14:useLocalDpi xmlns:a14="http://schemas.microsoft.com/office/drawing/2010/main" val="0"/>
+              </a:ext>
+            </a:extLst>
+          </a:blip>
+          <a:stretch>
+            <a:fillRect/>
+          </a:stretch>
+        </p:blipFill>
+        <p:spPr>
+          <a:xfrm>
+            <a:off x="2521439" y="569879"/>
+            <a:ext cx="1256866" cy="1882348"/>
+          </a:xfrm>
+          <a:prstGeom prst="rect">
+            <a:avLst/>
+          </a:prstGeom>
+        </p:spPr>
+      </p:pic>
     </p:spTree>
     <p:extLst>
       <p:ext uri="{BB962C8B-B14F-4D97-AF65-F5344CB8AC3E}">
-        <p14:creationId xmlns:p14="http://schemas.microsoft.com/office/powerpoint/2010/main" val="1860723180"/>
+        <p14:creationId xmlns:p14="http://schemas.microsoft.com/office/powerpoint/2010/main" val="1374445647"/>
       </p:ext>
     </p:extLst>
   </p:cSld>
@@ -3860,7 +3854,7 @@
         <p:spPr>
           <a:xfrm>
             <a:off x="509451" y="378822"/>
-            <a:ext cx="1920269" cy="369332"/>
+            <a:ext cx="1674946" cy="369332"/>
           </a:xfrm>
           <a:prstGeom prst="rect">
             <a:avLst/>
@@ -3875,7 +3869,7 @@
           <a:p>
             <a:r>
               <a:rPr lang="pt-BR" dirty="0" smtClean="0"/>
-              <a:t>Alessandro Guerra</a:t>
+              <a:t>Kleber Matheus</a:t>
             </a:r>
             <a:endParaRPr lang="pt-BR" dirty="0"/>
           </a:p>
@@ -4021,15 +4015,11 @@
             </a:r>
             <a:r>
               <a:rPr lang="pt-BR" dirty="0"/>
-              <a:t>4</a:t>
-            </a:r>
-            <a:r>
-              <a:rPr lang="pt-BR" dirty="0" smtClean="0"/>
-              <a:t> </a:t>
-            </a:r>
-            <a:r>
-              <a:rPr lang="pt-BR" dirty="0" smtClean="0"/>
-              <a:t>anos</a:t>
+              <a:t>3</a:t>
+            </a:r>
+            <a:r>
+              <a:rPr lang="pt-BR" dirty="0" smtClean="0"/>
+              <a:t> anos</a:t>
             </a:r>
           </a:p>
           <a:p>
@@ -4041,16 +4031,14 @@
           <a:p>
             <a:r>
               <a:rPr lang="pt-BR" dirty="0" smtClean="0"/>
-              <a:t>Gerente de Processos</a:t>
-            </a:r>
-            <a:endParaRPr lang="pt-BR" dirty="0" smtClean="0"/>
-          </a:p>
-          <a:p>
-            <a:r>
-              <a:rPr lang="pt-BR" dirty="0" smtClean="0"/>
-              <a:t>MBA em Gestão de Tecnologia</a:t>
-            </a:r>
-            <a:endParaRPr lang="pt-BR" dirty="0" smtClean="0"/>
+              <a:t>Analista de Sistemas</a:t>
+            </a:r>
+          </a:p>
+          <a:p>
+            <a:r>
+              <a:rPr lang="pt-BR" dirty="0" smtClean="0"/>
+              <a:t>Profissional em DBA</a:t>
+            </a:r>
           </a:p>
           <a:p>
             <a:endParaRPr lang="pt-BR" dirty="0" smtClean="0"/>
@@ -4098,7 +4086,7 @@
             </a:pPr>
             <a:r>
               <a:rPr lang="pt-BR" dirty="0" smtClean="0"/>
-              <a:t>Baixo desempenho</a:t>
+              <a:t>Máquina com lentidão</a:t>
             </a:r>
           </a:p>
           <a:p>
@@ -4108,7 +4096,7 @@
             </a:pPr>
             <a:r>
               <a:rPr lang="pt-BR" dirty="0" smtClean="0"/>
-              <a:t>Recorrência de problemas</a:t>
+              <a:t>CPU com gargalo</a:t>
             </a:r>
           </a:p>
           <a:p>
@@ -4118,7 +4106,7 @@
             </a:pPr>
             <a:r>
               <a:rPr lang="pt-BR" dirty="0" smtClean="0"/>
-              <a:t>Falhas de processo</a:t>
+              <a:t>Esgotamento de memória</a:t>
             </a:r>
           </a:p>
           <a:p>
@@ -4128,7 +4116,7 @@
             </a:pPr>
             <a:r>
               <a:rPr lang="pt-BR" dirty="0" smtClean="0"/>
-              <a:t>Configurações gráficas</a:t>
+              <a:t>Sobrecarga de sistema</a:t>
             </a:r>
           </a:p>
           <a:p>
@@ -4138,14 +4126,8 @@
             </a:pPr>
             <a:r>
               <a:rPr lang="pt-BR" dirty="0" smtClean="0"/>
-              <a:t>Baixo volume de comunicação</a:t>
-            </a:r>
-          </a:p>
-          <a:p>
-            <a:pPr marL="285750" indent="-285750">
-              <a:buFont typeface="Courier New" panose="02070309020205020404" pitchFamily="49" charset="0"/>
-              <a:buChar char="o"/>
-            </a:pPr>
+              <a:t>Alta temperatura da máquina</a:t>
+            </a:r>
             <a:endParaRPr lang="pt-BR" dirty="0"/>
           </a:p>
         </p:txBody>
@@ -4228,8 +4210,8 @@
         </p:nvSpPr>
         <p:spPr bwMode="auto">
           <a:xfrm>
-            <a:off x="7033415" y="3006298"/>
-            <a:ext cx="3454128" cy="1957587"/>
+            <a:off x="7033415" y="3006299"/>
+            <a:ext cx="3454128" cy="1693382"/>
           </a:xfrm>
           <a:prstGeom prst="rect">
             <a:avLst/>
@@ -4259,8 +4241,9 @@
             </a:pPr>
             <a:r>
               <a:rPr lang="pt-BR" dirty="0" smtClean="0"/>
-              <a:t>Saber parâmetros dos problemas mais reincidentes</a:t>
-            </a:r>
+              <a:t>Captação de dados da máquina</a:t>
+            </a:r>
+            <a:endParaRPr lang="pt-BR" dirty="0" smtClean="0"/>
           </a:p>
           <a:p>
             <a:pPr marL="285750" indent="-285750">
@@ -4269,38 +4252,13 @@
             </a:pPr>
             <a:r>
               <a:rPr lang="pt-BR" dirty="0" smtClean="0"/>
-              <a:t>Tempo médio das manutenções</a:t>
-            </a:r>
-          </a:p>
-          <a:p>
-            <a:pPr marL="285750" indent="-285750">
-              <a:buFont typeface="Courier New" panose="02070309020205020404" pitchFamily="49" charset="0"/>
-              <a:buChar char="o"/>
-            </a:pPr>
-            <a:r>
-              <a:rPr lang="pt-BR" dirty="0" smtClean="0"/>
-              <a:t>Periodicidade de falhas</a:t>
-            </a:r>
-          </a:p>
-          <a:p>
-            <a:pPr marL="285750" indent="-285750">
-              <a:buFont typeface="Courier New" panose="02070309020205020404" pitchFamily="49" charset="0"/>
-              <a:buChar char="o"/>
-            </a:pPr>
-            <a:r>
-              <a:rPr lang="pt-BR" dirty="0" smtClean="0"/>
-              <a:t>Visualização gráfica</a:t>
-            </a:r>
-          </a:p>
-          <a:p>
-            <a:pPr marL="285750" indent="-285750">
-              <a:buFont typeface="Courier New" panose="02070309020205020404" pitchFamily="49" charset="0"/>
-              <a:buChar char="o"/>
-            </a:pPr>
-            <a:r>
-              <a:rPr lang="pt-BR" dirty="0" smtClean="0"/>
-              <a:t>Comunicação por alertas</a:t>
-            </a:r>
+              <a:t>Utilização da </a:t>
+            </a:r>
+            <a:r>
+              <a:rPr lang="pt-BR" dirty="0" err="1" smtClean="0"/>
+              <a:t>cloud</a:t>
+            </a:r>
+            <a:endParaRPr lang="pt-BR" dirty="0" smtClean="0"/>
           </a:p>
           <a:p>
             <a:pPr marL="285750" indent="-285750">
@@ -4309,27 +4267,33 @@
             </a:pPr>
             <a:endParaRPr lang="pt-BR" dirty="0" smtClean="0"/>
           </a:p>
-          <a:p>
-            <a:pPr marL="285750" indent="-285750">
-              <a:buFont typeface="Courier New" panose="02070309020205020404" pitchFamily="49" charset="0"/>
-              <a:buChar char="o"/>
-            </a:pPr>
-            <a:endParaRPr lang="pt-BR" dirty="0"/>
-          </a:p>
-        </p:txBody>
-      </p:sp>
-      <p:sp>
-        <p:nvSpPr>
-          <p:cNvPr id="20" name="AutoShape 2" descr="Sérgio Reis - Home | Facebook"/>
-          <p:cNvSpPr>
-            <a:spLocks noChangeAspect="1" noChangeArrowheads="1"/>
-          </p:cNvSpPr>
+        </p:txBody>
+      </p:sp>
+      <p:pic>
+        <p:nvPicPr>
+          <p:cNvPr id="1030" name="Picture 6" descr="Vai sobrar emprego para estes 6 profissionais de TI em 2018 | Exame"/>
+          <p:cNvPicPr>
+            <a:picLocks noChangeAspect="1" noChangeArrowheads="1"/>
+          </p:cNvPicPr>
           <p:nvPr/>
-        </p:nvSpPr>
+        </p:nvPicPr>
+        <p:blipFill>
+          <a:blip r:embed="rId2" cstate="print">
+            <a:extLst>
+              <a:ext uri="{28A0092B-C50C-407E-A947-70E740481C1C}">
+                <a14:useLocalDpi xmlns:a14="http://schemas.microsoft.com/office/drawing/2010/main" val="0"/>
+              </a:ext>
+            </a:extLst>
+          </a:blip>
+          <a:srcRect/>
+          <a:stretch>
+            <a:fillRect/>
+          </a:stretch>
+        </p:blipFill>
         <p:spPr bwMode="auto">
           <a:xfrm>
-            <a:off x="4467084" y="6518997"/>
-            <a:ext cx="3257833" cy="462921"/>
+            <a:off x="1329868" y="840228"/>
+            <a:ext cx="2299844" cy="1533230"/>
           </a:xfrm>
           <a:prstGeom prst="rect">
             <a:avLst/>
@@ -4345,6 +4309,34 @@
             </a:ext>
           </a:extLst>
         </p:spPr>
+      </p:pic>
+      <p:sp>
+        <p:nvSpPr>
+          <p:cNvPr id="20" name="AutoShape 2" descr="Sérgio Reis - Home | Facebook"/>
+          <p:cNvSpPr>
+            <a:spLocks noChangeAspect="1" noChangeArrowheads="1"/>
+          </p:cNvSpPr>
+          <p:nvPr/>
+        </p:nvSpPr>
+        <p:spPr bwMode="auto">
+          <a:xfrm>
+            <a:off x="4395238" y="6518997"/>
+            <a:ext cx="3401524" cy="462921"/>
+          </a:xfrm>
+          <a:prstGeom prst="rect">
+            <a:avLst/>
+          </a:prstGeom>
+          <a:noFill/>
+          <a:extLst>
+            <a:ext uri="{909E8E84-426E-40DD-AFC4-6F175D3DCCD1}">
+              <a14:hiddenFill xmlns:a14="http://schemas.microsoft.com/office/drawing/2010/main">
+                <a:solidFill>
+                  <a:srgbClr val="FFFFFF"/>
+                </a:solidFill>
+              </a14:hiddenFill>
+            </a:ext>
+          </a:extLst>
+        </p:spPr>
         <p:txBody>
           <a:bodyPr vert="horz" wrap="square" lIns="91440" tIns="45720" rIns="91440" bIns="45720" numCol="1" anchor="t" anchorCtr="0" compatLnSpc="1">
             <a:prstTxWarp prst="textNoShape">
@@ -4363,46 +4355,16 @@
             </a:r>
             <a:r>
               <a:rPr lang="pt-BR" dirty="0" smtClean="0"/>
-              <a:t> (Gerente)</a:t>
+              <a:t> (Operação)</a:t>
             </a:r>
             <a:endParaRPr lang="pt-BR" dirty="0"/>
           </a:p>
         </p:txBody>
       </p:sp>
-      <p:pic>
-        <p:nvPicPr>
-          <p:cNvPr id="6" name="Imagem 5" descr="&lt;strong&gt;Gerente&lt;/strong&gt; General División El Teniente, Andrés Music | Flickr"/>
-          <p:cNvPicPr>
-            <a:picLocks noChangeAspect="1"/>
-          </p:cNvPicPr>
-          <p:nvPr/>
-        </p:nvPicPr>
-        <p:blipFill>
-          <a:blip r:embed="rId2">
-            <a:extLst>
-              <a:ext uri="{28A0092B-C50C-407E-A947-70E740481C1C}">
-                <a14:useLocalDpi xmlns:a14="http://schemas.microsoft.com/office/drawing/2010/main" val="0"/>
-              </a:ext>
-            </a:extLst>
-          </a:blip>
-          <a:stretch>
-            <a:fillRect/>
-          </a:stretch>
-        </p:blipFill>
-        <p:spPr>
-          <a:xfrm>
-            <a:off x="2521439" y="569879"/>
-            <a:ext cx="1256866" cy="1882348"/>
-          </a:xfrm>
-          <a:prstGeom prst="rect">
-            <a:avLst/>
-          </a:prstGeom>
-        </p:spPr>
-      </p:pic>
     </p:spTree>
     <p:extLst>
       <p:ext uri="{BB962C8B-B14F-4D97-AF65-F5344CB8AC3E}">
-        <p14:creationId xmlns:p14="http://schemas.microsoft.com/office/powerpoint/2010/main" val="1374445647"/>
+        <p14:creationId xmlns:p14="http://schemas.microsoft.com/office/powerpoint/2010/main" val="1860723180"/>
       </p:ext>
     </p:extLst>
   </p:cSld>
@@ -4872,7 +4834,6 @@
               <a:rPr lang="pt-BR" dirty="0" smtClean="0"/>
               <a:t>Falta de ferramenta visual </a:t>
             </a:r>
-            <a:endParaRPr lang="pt-BR" dirty="0" smtClean="0"/>
           </a:p>
           <a:p>
             <a:pPr marL="285750" indent="-285750">
@@ -4883,7 +4844,6 @@
               <a:rPr lang="pt-BR" dirty="0" smtClean="0"/>
               <a:t>Acesso pouco prático</a:t>
             </a:r>
-            <a:endParaRPr lang="pt-BR" dirty="0" smtClean="0"/>
           </a:p>
           <a:p>
             <a:pPr marL="285750" indent="-285750">
@@ -4965,7 +4925,11 @@
           <a:p>
             <a:r>
               <a:rPr lang="pt-BR" dirty="0" smtClean="0"/>
-              <a:t>Objetiva</a:t>
+              <a:t>Cliente/usuário do </a:t>
+            </a:r>
+            <a:r>
+              <a:rPr lang="pt-BR" dirty="0" err="1" smtClean="0"/>
+              <a:t>SixMinds</a:t>
             </a:r>
             <a:endParaRPr lang="pt-BR" dirty="0"/>
           </a:p>
@@ -5120,11 +5084,7 @@
             </a:pPr>
             <a:r>
               <a:rPr lang="pt-BR" dirty="0" smtClean="0"/>
-              <a:t>Ferramenta </a:t>
-            </a:r>
-            <a:r>
-              <a:rPr lang="pt-BR" dirty="0" smtClean="0"/>
-              <a:t>visual</a:t>
+              <a:t>Ferramenta visual</a:t>
             </a:r>
           </a:p>
           <a:p>
@@ -5136,7 +5096,6 @@
               <a:rPr lang="pt-BR" dirty="0" smtClean="0"/>
               <a:t>Plataforma em nuvem</a:t>
             </a:r>
-            <a:endParaRPr lang="pt-BR" dirty="0" smtClean="0"/>
           </a:p>
           <a:p>
             <a:pPr marL="285750" indent="-285750">

</xml_diff>